<commit_message>
SDM 1 extra page
</commit_message>
<xml_diff>
--- a/fig/at_model.pptx
+++ b/fig/at_model.pptx
@@ -7,6 +7,7 @@
   <p:sldIdLst>
     <p:sldId id="256" r:id="rId2"/>
     <p:sldId id="257" r:id="rId3"/>
+    <p:sldId id="258" r:id="rId4"/>
   </p:sldIdLst>
   <p:sldSz cx="9144000" cy="6858000" type="screen4x3"/>
   <p:notesSz cx="6858000" cy="9144000"/>
@@ -289,7 +290,7 @@
           <a:p>
             <a:fld id="{7BDDF2AD-C59E-994E-9844-33166E577A48}" type="datetimeFigureOut">
               <a:rPr lang="en-US" smtClean="0"/>
-              <a:t>5/18/14</a:t>
+              <a:t>7/3/14</a:t>
             </a:fld>
             <a:endParaRPr lang="en-US"/>
           </a:p>
@@ -459,7 +460,7 @@
           <a:p>
             <a:fld id="{7BDDF2AD-C59E-994E-9844-33166E577A48}" type="datetimeFigureOut">
               <a:rPr lang="en-US" smtClean="0"/>
-              <a:t>5/18/14</a:t>
+              <a:t>7/3/14</a:t>
             </a:fld>
             <a:endParaRPr lang="en-US"/>
           </a:p>
@@ -639,7 +640,7 @@
           <a:p>
             <a:fld id="{7BDDF2AD-C59E-994E-9844-33166E577A48}" type="datetimeFigureOut">
               <a:rPr lang="en-US" smtClean="0"/>
-              <a:t>5/18/14</a:t>
+              <a:t>7/3/14</a:t>
             </a:fld>
             <a:endParaRPr lang="en-US"/>
           </a:p>
@@ -809,7 +810,7 @@
           <a:p>
             <a:fld id="{7BDDF2AD-C59E-994E-9844-33166E577A48}" type="datetimeFigureOut">
               <a:rPr lang="en-US" smtClean="0"/>
-              <a:t>5/18/14</a:t>
+              <a:t>7/3/14</a:t>
             </a:fld>
             <a:endParaRPr lang="en-US"/>
           </a:p>
@@ -1055,7 +1056,7 @@
           <a:p>
             <a:fld id="{7BDDF2AD-C59E-994E-9844-33166E577A48}" type="datetimeFigureOut">
               <a:rPr lang="en-US" smtClean="0"/>
-              <a:t>5/18/14</a:t>
+              <a:t>7/3/14</a:t>
             </a:fld>
             <a:endParaRPr lang="en-US"/>
           </a:p>
@@ -1343,7 +1344,7 @@
           <a:p>
             <a:fld id="{7BDDF2AD-C59E-994E-9844-33166E577A48}" type="datetimeFigureOut">
               <a:rPr lang="en-US" smtClean="0"/>
-              <a:t>5/18/14</a:t>
+              <a:t>7/3/14</a:t>
             </a:fld>
             <a:endParaRPr lang="en-US"/>
           </a:p>
@@ -1765,7 +1766,7 @@
           <a:p>
             <a:fld id="{7BDDF2AD-C59E-994E-9844-33166E577A48}" type="datetimeFigureOut">
               <a:rPr lang="en-US" smtClean="0"/>
-              <a:t>5/18/14</a:t>
+              <a:t>7/3/14</a:t>
             </a:fld>
             <a:endParaRPr lang="en-US"/>
           </a:p>
@@ -1883,7 +1884,7 @@
           <a:p>
             <a:fld id="{7BDDF2AD-C59E-994E-9844-33166E577A48}" type="datetimeFigureOut">
               <a:rPr lang="en-US" smtClean="0"/>
-              <a:t>5/18/14</a:t>
+              <a:t>7/3/14</a:t>
             </a:fld>
             <a:endParaRPr lang="en-US"/>
           </a:p>
@@ -1978,7 +1979,7 @@
           <a:p>
             <a:fld id="{7BDDF2AD-C59E-994E-9844-33166E577A48}" type="datetimeFigureOut">
               <a:rPr lang="en-US" smtClean="0"/>
-              <a:t>5/18/14</a:t>
+              <a:t>7/3/14</a:t>
             </a:fld>
             <a:endParaRPr lang="en-US"/>
           </a:p>
@@ -2255,7 +2256,7 @@
           <a:p>
             <a:fld id="{7BDDF2AD-C59E-994E-9844-33166E577A48}" type="datetimeFigureOut">
               <a:rPr lang="en-US" smtClean="0"/>
-              <a:t>5/18/14</a:t>
+              <a:t>7/3/14</a:t>
             </a:fld>
             <a:endParaRPr lang="en-US"/>
           </a:p>
@@ -2508,7 +2509,7 @@
           <a:p>
             <a:fld id="{7BDDF2AD-C59E-994E-9844-33166E577A48}" type="datetimeFigureOut">
               <a:rPr lang="en-US" smtClean="0"/>
-              <a:t>5/18/14</a:t>
+              <a:t>7/3/14</a:t>
             </a:fld>
             <a:endParaRPr lang="en-US"/>
           </a:p>
@@ -2721,7 +2722,7 @@
           <a:p>
             <a:fld id="{7BDDF2AD-C59E-994E-9844-33166E577A48}" type="datetimeFigureOut">
               <a:rPr lang="en-US" smtClean="0"/>
-              <a:t>5/18/14</a:t>
+              <a:t>7/3/14</a:t>
             </a:fld>
             <a:endParaRPr lang="en-US"/>
           </a:p>
@@ -4363,7 +4364,7 @@
         <p:spPr>
           <a:xfrm>
             <a:off x="3968432" y="2184639"/>
-            <a:ext cx="237640" cy="369332"/>
+            <a:ext cx="295236" cy="369332"/>
           </a:xfrm>
           <a:prstGeom prst="rect">
             <a:avLst/>
@@ -4383,7 +4384,7 @@
                 <a:latin typeface="+mj-lt"/>
                 <a:cs typeface="Apple Chancery"/>
               </a:rPr>
-              <a:t>l</a:t>
+              <a:t>a</a:t>
             </a:r>
             <a:endParaRPr lang="en-US" dirty="0">
               <a:latin typeface="+mj-lt"/>
@@ -4576,8 +4577,8 @@
         </p:nvSpPr>
         <p:spPr>
           <a:xfrm>
-            <a:off x="1528862" y="2013628"/>
-            <a:ext cx="969534" cy="803416"/>
+            <a:off x="1143000" y="1922912"/>
+            <a:ext cx="1306813" cy="937683"/>
           </a:xfrm>
           <a:prstGeom prst="rect">
             <a:avLst/>
@@ -4620,7 +4621,7 @@
         </p:nvSpPr>
         <p:spPr>
           <a:xfrm>
-            <a:off x="1726867" y="2122864"/>
+            <a:off x="1509151" y="2122864"/>
             <a:ext cx="585216" cy="584943"/>
           </a:xfrm>
           <a:prstGeom prst="ellipse">
@@ -4798,7 +4799,7 @@
         </p:nvSpPr>
         <p:spPr>
           <a:xfrm>
-            <a:off x="1782042" y="1156049"/>
+            <a:off x="1564326" y="1156049"/>
             <a:ext cx="457200" cy="457200"/>
           </a:xfrm>
           <a:prstGeom prst="ellipse">
@@ -4842,7 +4843,7 @@
         </p:nvSpPr>
         <p:spPr>
           <a:xfrm>
-            <a:off x="1863422" y="1162641"/>
+            <a:off x="1645706" y="1162641"/>
             <a:ext cx="315636" cy="369332"/>
           </a:xfrm>
           <a:prstGeom prst="rect">
@@ -4932,7 +4933,7 @@
         </p:nvSpPr>
         <p:spPr>
           <a:xfrm>
-            <a:off x="1856896" y="2228016"/>
+            <a:off x="1639180" y="2228016"/>
             <a:ext cx="307408" cy="369332"/>
           </a:xfrm>
           <a:prstGeom prst="rect">
@@ -5040,7 +5041,6 @@
               <a:rPr lang="en-US" dirty="0"/>
               <a:t>S</a:t>
             </a:r>
-            <a:endParaRPr lang="en-US" dirty="0"/>
           </a:p>
         </p:txBody>
       </p:sp>
@@ -5115,8 +5115,8 @@
         </p:nvSpPr>
         <p:spPr>
           <a:xfrm>
-            <a:off x="2260650" y="2475022"/>
-            <a:ext cx="287258" cy="369332"/>
+            <a:off x="2042934" y="2475022"/>
+            <a:ext cx="439675" cy="369332"/>
           </a:xfrm>
           <a:prstGeom prst="rect">
             <a:avLst/>
@@ -5130,8 +5130,12 @@
           <a:lstStyle/>
           <a:p>
             <a:r>
-              <a:rPr lang="en-US" dirty="0"/>
-              <a:t>L</a:t>
+              <a:rPr lang="el-GR" i="1" dirty="0"/>
+              <a:t>Α</a:t>
+            </a:r>
+            <a:r>
+              <a:rPr lang="el-GR" i="1" baseline="-25000" dirty="0"/>
+              <a:t>Ω</a:t>
             </a:r>
             <a:endParaRPr lang="en-US" dirty="0"/>
           </a:p>
@@ -5148,7 +5152,7 @@
         </p:nvCxnSpPr>
         <p:spPr>
           <a:xfrm>
-            <a:off x="2010642" y="1613249"/>
+            <a:off x="1792926" y="1613249"/>
             <a:ext cx="8833" cy="509615"/>
           </a:xfrm>
           <a:prstGeom prst="straightConnector1">
@@ -5187,8 +5191,8 @@
         </p:nvCxnSpPr>
         <p:spPr>
           <a:xfrm>
-            <a:off x="2312083" y="2415336"/>
-            <a:ext cx="1559735" cy="801319"/>
+            <a:off x="2094367" y="2415336"/>
+            <a:ext cx="1777451" cy="801319"/>
           </a:xfrm>
           <a:prstGeom prst="straightConnector1">
             <a:avLst/>
@@ -5791,6 +5795,1671 @@
     <p:extLst>
       <p:ext uri="{BB962C8B-B14F-4D97-AF65-F5344CB8AC3E}">
         <p14:creationId xmlns:p14="http://schemas.microsoft.com/office/powerpoint/2010/main" val="105339822"/>
+      </p:ext>
+    </p:extLst>
+  </p:cSld>
+  <p:clrMapOvr>
+    <a:masterClrMapping/>
+  </p:clrMapOvr>
+</p:sld>
+</file>
+
+<file path=ppt/slides/slide3.xml><?xml version="1.0" encoding="utf-8"?>
+<p:sld xmlns:a="http://schemas.openxmlformats.org/drawingml/2006/main" xmlns:r="http://schemas.openxmlformats.org/officeDocument/2006/relationships" xmlns:p="http://schemas.openxmlformats.org/presentationml/2006/main">
+  <p:cSld>
+    <p:spTree>
+      <p:nvGrpSpPr>
+        <p:cNvPr id="1" name=""/>
+        <p:cNvGrpSpPr/>
+        <p:nvPr/>
+      </p:nvGrpSpPr>
+      <p:grpSpPr>
+        <a:xfrm>
+          <a:off x="0" y="0"/>
+          <a:ext cx="0" cy="0"/>
+          <a:chOff x="0" y="0"/>
+          <a:chExt cx="0" cy="0"/>
+        </a:xfrm>
+      </p:grpSpPr>
+      <p:sp>
+        <p:nvSpPr>
+          <p:cNvPr id="4" name="Oval 3"/>
+          <p:cNvSpPr/>
+          <p:nvPr/>
+        </p:nvSpPr>
+        <p:spPr>
+          <a:xfrm>
+            <a:off x="3871818" y="2153803"/>
+            <a:ext cx="457200" cy="457200"/>
+          </a:xfrm>
+          <a:prstGeom prst="ellipse">
+            <a:avLst/>
+          </a:prstGeom>
+          <a:solidFill>
+            <a:schemeClr val="bg1">
+              <a:lumMod val="50000"/>
+            </a:schemeClr>
+          </a:solidFill>
+          <a:ln>
+            <a:solidFill>
+              <a:srgbClr val="000000"/>
+            </a:solidFill>
+          </a:ln>
+        </p:spPr>
+        <p:style>
+          <a:lnRef idx="1">
+            <a:schemeClr val="accent1"/>
+          </a:lnRef>
+          <a:fillRef idx="3">
+            <a:schemeClr val="accent1"/>
+          </a:fillRef>
+          <a:effectRef idx="2">
+            <a:schemeClr val="accent1"/>
+          </a:effectRef>
+          <a:fontRef idx="minor">
+            <a:schemeClr val="lt1"/>
+          </a:fontRef>
+        </p:style>
+        <p:txBody>
+          <a:bodyPr rtlCol="0" anchor="ctr"/>
+          <a:lstStyle/>
+          <a:p>
+            <a:pPr algn="ctr"/>
+            <a:endParaRPr lang="en-US"/>
+          </a:p>
+        </p:txBody>
+      </p:sp>
+      <p:sp>
+        <p:nvSpPr>
+          <p:cNvPr id="5" name="TextBox 4"/>
+          <p:cNvSpPr txBox="1"/>
+          <p:nvPr/>
+        </p:nvSpPr>
+        <p:spPr>
+          <a:xfrm>
+            <a:off x="3968432" y="2184639"/>
+            <a:ext cx="295236" cy="369332"/>
+          </a:xfrm>
+          <a:prstGeom prst="rect">
+            <a:avLst/>
+          </a:prstGeom>
+          <a:solidFill>
+            <a:srgbClr val="7F7F7F"/>
+          </a:solidFill>
+        </p:spPr>
+        <p:txBody>
+          <a:bodyPr wrap="none" rtlCol="0">
+            <a:spAutoFit/>
+          </a:bodyPr>
+          <a:lstStyle/>
+          <a:p>
+            <a:r>
+              <a:rPr lang="en-US" dirty="0">
+                <a:latin typeface="+mj-lt"/>
+                <a:cs typeface="Apple Chancery"/>
+              </a:rPr>
+              <a:t>a</a:t>
+            </a:r>
+          </a:p>
+        </p:txBody>
+      </p:sp>
+      <p:sp>
+        <p:nvSpPr>
+          <p:cNvPr id="6" name="Rectangle 5"/>
+          <p:cNvSpPr/>
+          <p:nvPr/>
+        </p:nvSpPr>
+        <p:spPr>
+          <a:xfrm>
+            <a:off x="3015022" y="1784260"/>
+            <a:ext cx="2135781" cy="3031308"/>
+          </a:xfrm>
+          <a:prstGeom prst="rect">
+            <a:avLst/>
+          </a:prstGeom>
+          <a:noFill/>
+          <a:ln>
+            <a:solidFill>
+              <a:schemeClr val="tx1"/>
+            </a:solidFill>
+          </a:ln>
+        </p:spPr>
+        <p:style>
+          <a:lnRef idx="1">
+            <a:schemeClr val="accent1"/>
+          </a:lnRef>
+          <a:fillRef idx="3">
+            <a:schemeClr val="accent1"/>
+          </a:fillRef>
+          <a:effectRef idx="2">
+            <a:schemeClr val="accent1"/>
+          </a:effectRef>
+          <a:fontRef idx="minor">
+            <a:schemeClr val="lt1"/>
+          </a:fontRef>
+        </p:style>
+        <p:txBody>
+          <a:bodyPr rtlCol="0" anchor="ctr"/>
+          <a:lstStyle/>
+          <a:p>
+            <a:pPr algn="ctr"/>
+            <a:endParaRPr lang="en-US"/>
+          </a:p>
+        </p:txBody>
+      </p:sp>
+      <p:sp>
+        <p:nvSpPr>
+          <p:cNvPr id="7" name="Rectangle 6"/>
+          <p:cNvSpPr/>
+          <p:nvPr/>
+        </p:nvSpPr>
+        <p:spPr>
+          <a:xfrm>
+            <a:off x="2631551" y="1046911"/>
+            <a:ext cx="2854408" cy="4219257"/>
+          </a:xfrm>
+          <a:prstGeom prst="rect">
+            <a:avLst/>
+          </a:prstGeom>
+          <a:noFill/>
+          <a:ln>
+            <a:solidFill>
+              <a:schemeClr val="tx1"/>
+            </a:solidFill>
+          </a:ln>
+        </p:spPr>
+        <p:style>
+          <a:lnRef idx="1">
+            <a:schemeClr val="accent1"/>
+          </a:lnRef>
+          <a:fillRef idx="3">
+            <a:schemeClr val="accent1"/>
+          </a:fillRef>
+          <a:effectRef idx="2">
+            <a:schemeClr val="accent1"/>
+          </a:effectRef>
+          <a:fontRef idx="minor">
+            <a:schemeClr val="lt1"/>
+          </a:fontRef>
+        </p:style>
+        <p:txBody>
+          <a:bodyPr rtlCol="0" anchor="ctr"/>
+          <a:lstStyle/>
+          <a:p>
+            <a:pPr algn="ctr"/>
+            <a:endParaRPr lang="en-US"/>
+          </a:p>
+        </p:txBody>
+      </p:sp>
+      <p:sp>
+        <p:nvSpPr>
+          <p:cNvPr id="8" name="Rectangle 7"/>
+          <p:cNvSpPr/>
+          <p:nvPr/>
+        </p:nvSpPr>
+        <p:spPr>
+          <a:xfrm>
+            <a:off x="1534708" y="3926889"/>
+            <a:ext cx="969534" cy="803416"/>
+          </a:xfrm>
+          <a:prstGeom prst="rect">
+            <a:avLst/>
+          </a:prstGeom>
+          <a:noFill/>
+          <a:ln>
+            <a:solidFill>
+              <a:schemeClr val="tx1"/>
+            </a:solidFill>
+          </a:ln>
+        </p:spPr>
+        <p:style>
+          <a:lnRef idx="1">
+            <a:schemeClr val="accent1"/>
+          </a:lnRef>
+          <a:fillRef idx="3">
+            <a:schemeClr val="accent1"/>
+          </a:fillRef>
+          <a:effectRef idx="2">
+            <a:schemeClr val="accent1"/>
+          </a:effectRef>
+          <a:fontRef idx="minor">
+            <a:schemeClr val="lt1"/>
+          </a:fontRef>
+        </p:style>
+        <p:txBody>
+          <a:bodyPr rtlCol="0" anchor="ctr"/>
+          <a:lstStyle/>
+          <a:p>
+            <a:pPr algn="ctr"/>
+            <a:endParaRPr lang="en-US"/>
+          </a:p>
+        </p:txBody>
+      </p:sp>
+      <p:sp>
+        <p:nvSpPr>
+          <p:cNvPr id="9" name="Oval 8"/>
+          <p:cNvSpPr/>
+          <p:nvPr/>
+        </p:nvSpPr>
+        <p:spPr>
+          <a:xfrm>
+            <a:off x="1732713" y="4036125"/>
+            <a:ext cx="585216" cy="584943"/>
+          </a:xfrm>
+          <a:prstGeom prst="ellipse">
+            <a:avLst/>
+          </a:prstGeom>
+          <a:noFill/>
+          <a:ln>
+            <a:solidFill>
+              <a:srgbClr val="000000"/>
+            </a:solidFill>
+          </a:ln>
+        </p:spPr>
+        <p:style>
+          <a:lnRef idx="1">
+            <a:schemeClr val="accent1"/>
+          </a:lnRef>
+          <a:fillRef idx="3">
+            <a:schemeClr val="accent1"/>
+          </a:fillRef>
+          <a:effectRef idx="2">
+            <a:schemeClr val="accent1"/>
+          </a:effectRef>
+          <a:fontRef idx="minor">
+            <a:schemeClr val="lt1"/>
+          </a:fontRef>
+        </p:style>
+        <p:txBody>
+          <a:bodyPr rtlCol="0" anchor="ctr"/>
+          <a:lstStyle/>
+          <a:p>
+            <a:pPr algn="ctr"/>
+            <a:endParaRPr lang="en-US"/>
+          </a:p>
+        </p:txBody>
+      </p:sp>
+      <p:sp>
+        <p:nvSpPr>
+          <p:cNvPr id="12" name="Rectangle 11"/>
+          <p:cNvSpPr/>
+          <p:nvPr/>
+        </p:nvSpPr>
+        <p:spPr>
+          <a:xfrm>
+            <a:off x="1314915" y="2013627"/>
+            <a:ext cx="1183481" cy="973969"/>
+          </a:xfrm>
+          <a:prstGeom prst="rect">
+            <a:avLst/>
+          </a:prstGeom>
+          <a:noFill/>
+          <a:ln>
+            <a:solidFill>
+              <a:schemeClr val="tx1"/>
+            </a:solidFill>
+          </a:ln>
+        </p:spPr>
+        <p:style>
+          <a:lnRef idx="1">
+            <a:schemeClr val="accent1"/>
+          </a:lnRef>
+          <a:fillRef idx="3">
+            <a:schemeClr val="accent1"/>
+          </a:fillRef>
+          <a:effectRef idx="2">
+            <a:schemeClr val="accent1"/>
+          </a:effectRef>
+          <a:fontRef idx="minor">
+            <a:schemeClr val="lt1"/>
+          </a:fontRef>
+        </p:style>
+        <p:txBody>
+          <a:bodyPr rtlCol="0" anchor="ctr"/>
+          <a:lstStyle/>
+          <a:p>
+            <a:pPr algn="ctr"/>
+            <a:endParaRPr lang="en-US"/>
+          </a:p>
+        </p:txBody>
+      </p:sp>
+      <p:sp>
+        <p:nvSpPr>
+          <p:cNvPr id="13" name="Oval 12"/>
+          <p:cNvSpPr/>
+          <p:nvPr/>
+        </p:nvSpPr>
+        <p:spPr>
+          <a:xfrm>
+            <a:off x="1513326" y="2156578"/>
+            <a:ext cx="585216" cy="584943"/>
+          </a:xfrm>
+          <a:prstGeom prst="ellipse">
+            <a:avLst/>
+          </a:prstGeom>
+          <a:noFill/>
+          <a:ln>
+            <a:solidFill>
+              <a:srgbClr val="000000"/>
+            </a:solidFill>
+          </a:ln>
+        </p:spPr>
+        <p:style>
+          <a:lnRef idx="1">
+            <a:schemeClr val="accent1"/>
+          </a:lnRef>
+          <a:fillRef idx="3">
+            <a:schemeClr val="accent1"/>
+          </a:fillRef>
+          <a:effectRef idx="2">
+            <a:schemeClr val="accent1"/>
+          </a:effectRef>
+          <a:fontRef idx="minor">
+            <a:schemeClr val="lt1"/>
+          </a:fontRef>
+        </p:style>
+        <p:txBody>
+          <a:bodyPr rtlCol="0" anchor="ctr"/>
+          <a:lstStyle/>
+          <a:p>
+            <a:pPr algn="ctr"/>
+            <a:endParaRPr lang="en-US"/>
+          </a:p>
+        </p:txBody>
+      </p:sp>
+      <p:sp>
+        <p:nvSpPr>
+          <p:cNvPr id="14" name="Oval 13"/>
+          <p:cNvSpPr/>
+          <p:nvPr/>
+        </p:nvSpPr>
+        <p:spPr>
+          <a:xfrm>
+            <a:off x="3871818" y="2988055"/>
+            <a:ext cx="457200" cy="457200"/>
+          </a:xfrm>
+          <a:prstGeom prst="ellipse">
+            <a:avLst/>
+          </a:prstGeom>
+          <a:noFill/>
+          <a:ln>
+            <a:solidFill>
+              <a:srgbClr val="000000"/>
+            </a:solidFill>
+          </a:ln>
+        </p:spPr>
+        <p:style>
+          <a:lnRef idx="1">
+            <a:schemeClr val="accent1"/>
+          </a:lnRef>
+          <a:fillRef idx="3">
+            <a:schemeClr val="accent1"/>
+          </a:fillRef>
+          <a:effectRef idx="2">
+            <a:schemeClr val="accent1"/>
+          </a:effectRef>
+          <a:fontRef idx="minor">
+            <a:schemeClr val="lt1"/>
+          </a:fontRef>
+        </p:style>
+        <p:txBody>
+          <a:bodyPr rtlCol="0" anchor="ctr"/>
+          <a:lstStyle/>
+          <a:p>
+            <a:pPr algn="ctr"/>
+            <a:endParaRPr lang="en-US"/>
+          </a:p>
+        </p:txBody>
+      </p:sp>
+      <p:sp>
+        <p:nvSpPr>
+          <p:cNvPr id="15" name="Oval 14"/>
+          <p:cNvSpPr/>
+          <p:nvPr/>
+        </p:nvSpPr>
+        <p:spPr>
+          <a:xfrm>
+            <a:off x="3378430" y="4091418"/>
+            <a:ext cx="457200" cy="457200"/>
+          </a:xfrm>
+          <a:prstGeom prst="ellipse">
+            <a:avLst/>
+          </a:prstGeom>
+          <a:solidFill>
+            <a:srgbClr val="7F7F7F"/>
+          </a:solidFill>
+          <a:ln>
+            <a:solidFill>
+              <a:srgbClr val="000000"/>
+            </a:solidFill>
+          </a:ln>
+        </p:spPr>
+        <p:style>
+          <a:lnRef idx="1">
+            <a:schemeClr val="accent1"/>
+          </a:lnRef>
+          <a:fillRef idx="3">
+            <a:schemeClr val="accent1"/>
+          </a:fillRef>
+          <a:effectRef idx="2">
+            <a:schemeClr val="accent1"/>
+          </a:effectRef>
+          <a:fontRef idx="minor">
+            <a:schemeClr val="lt1"/>
+          </a:fontRef>
+        </p:style>
+        <p:txBody>
+          <a:bodyPr rtlCol="0" anchor="ctr"/>
+          <a:lstStyle/>
+          <a:p>
+            <a:pPr algn="ctr"/>
+            <a:endParaRPr lang="en-US"/>
+          </a:p>
+        </p:txBody>
+      </p:sp>
+      <p:sp>
+        <p:nvSpPr>
+          <p:cNvPr id="18" name="Oval 17"/>
+          <p:cNvSpPr/>
+          <p:nvPr/>
+        </p:nvSpPr>
+        <p:spPr>
+          <a:xfrm>
+            <a:off x="1798229" y="5036435"/>
+            <a:ext cx="457200" cy="457200"/>
+          </a:xfrm>
+          <a:prstGeom prst="ellipse">
+            <a:avLst/>
+          </a:prstGeom>
+          <a:noFill/>
+          <a:ln>
+            <a:solidFill>
+              <a:srgbClr val="000000"/>
+            </a:solidFill>
+          </a:ln>
+        </p:spPr>
+        <p:style>
+          <a:lnRef idx="1">
+            <a:schemeClr val="accent1"/>
+          </a:lnRef>
+          <a:fillRef idx="3">
+            <a:schemeClr val="accent1"/>
+          </a:fillRef>
+          <a:effectRef idx="2">
+            <a:schemeClr val="accent1"/>
+          </a:effectRef>
+          <a:fontRef idx="minor">
+            <a:schemeClr val="lt1"/>
+          </a:fontRef>
+        </p:style>
+        <p:txBody>
+          <a:bodyPr rtlCol="0" anchor="ctr"/>
+          <a:lstStyle/>
+          <a:p>
+            <a:pPr algn="ctr"/>
+            <a:endParaRPr lang="en-US"/>
+          </a:p>
+        </p:txBody>
+      </p:sp>
+      <p:sp>
+        <p:nvSpPr>
+          <p:cNvPr id="19" name="Oval 18"/>
+          <p:cNvSpPr/>
+          <p:nvPr/>
+        </p:nvSpPr>
+        <p:spPr>
+          <a:xfrm>
+            <a:off x="1568501" y="1189763"/>
+            <a:ext cx="457200" cy="457200"/>
+          </a:xfrm>
+          <a:prstGeom prst="ellipse">
+            <a:avLst/>
+          </a:prstGeom>
+          <a:noFill/>
+          <a:ln>
+            <a:solidFill>
+              <a:srgbClr val="000000"/>
+            </a:solidFill>
+          </a:ln>
+        </p:spPr>
+        <p:style>
+          <a:lnRef idx="1">
+            <a:schemeClr val="accent1"/>
+          </a:lnRef>
+          <a:fillRef idx="3">
+            <a:schemeClr val="accent1"/>
+          </a:fillRef>
+          <a:effectRef idx="2">
+            <a:schemeClr val="accent1"/>
+          </a:effectRef>
+          <a:fontRef idx="minor">
+            <a:schemeClr val="lt1"/>
+          </a:fontRef>
+        </p:style>
+        <p:txBody>
+          <a:bodyPr rtlCol="0" anchor="ctr"/>
+          <a:lstStyle/>
+          <a:p>
+            <a:pPr algn="ctr"/>
+            <a:endParaRPr lang="en-US"/>
+          </a:p>
+        </p:txBody>
+      </p:sp>
+      <p:sp>
+        <p:nvSpPr>
+          <p:cNvPr id="20" name="TextBox 19"/>
+          <p:cNvSpPr txBox="1"/>
+          <p:nvPr/>
+        </p:nvSpPr>
+        <p:spPr>
+          <a:xfrm>
+            <a:off x="1661120" y="1196355"/>
+            <a:ext cx="315636" cy="369332"/>
+          </a:xfrm>
+          <a:prstGeom prst="rect">
+            <a:avLst/>
+          </a:prstGeom>
+          <a:noFill/>
+        </p:spPr>
+        <p:txBody>
+          <a:bodyPr wrap="none" rtlCol="0">
+            <a:spAutoFit/>
+          </a:bodyPr>
+          <a:lstStyle/>
+          <a:p>
+            <a:r>
+              <a:rPr lang="el-GR" dirty="0"/>
+              <a:t>α</a:t>
+            </a:r>
+            <a:endParaRPr lang="en-US" dirty="0"/>
+          </a:p>
+        </p:txBody>
+      </p:sp>
+      <p:sp>
+        <p:nvSpPr>
+          <p:cNvPr id="21" name="TextBox 20"/>
+          <p:cNvSpPr txBox="1"/>
+          <p:nvPr/>
+        </p:nvSpPr>
+        <p:spPr>
+          <a:xfrm>
+            <a:off x="1878813" y="5039289"/>
+            <a:ext cx="307296" cy="369332"/>
+          </a:xfrm>
+          <a:prstGeom prst="rect">
+            <a:avLst/>
+          </a:prstGeom>
+          <a:noFill/>
+        </p:spPr>
+        <p:txBody>
+          <a:bodyPr wrap="none" rtlCol="0">
+            <a:spAutoFit/>
+          </a:bodyPr>
+          <a:lstStyle/>
+          <a:p>
+            <a:r>
+              <a:rPr lang="el-GR" dirty="0"/>
+              <a:t>β</a:t>
+            </a:r>
+            <a:endParaRPr lang="en-US" dirty="0"/>
+          </a:p>
+        </p:txBody>
+      </p:sp>
+      <p:sp>
+        <p:nvSpPr>
+          <p:cNvPr id="23" name="TextBox 22"/>
+          <p:cNvSpPr txBox="1"/>
+          <p:nvPr/>
+        </p:nvSpPr>
+        <p:spPr>
+          <a:xfrm>
+            <a:off x="1876397" y="4109248"/>
+            <a:ext cx="335023" cy="369332"/>
+          </a:xfrm>
+          <a:prstGeom prst="rect">
+            <a:avLst/>
+          </a:prstGeom>
+          <a:noFill/>
+        </p:spPr>
+        <p:txBody>
+          <a:bodyPr wrap="none" rtlCol="0">
+            <a:spAutoFit/>
+          </a:bodyPr>
+          <a:lstStyle/>
+          <a:p>
+            <a:r>
+              <a:rPr lang="el-GR" dirty="0" smtClean="0"/>
+              <a:t>φ</a:t>
+            </a:r>
+            <a:endParaRPr lang="en-US" dirty="0"/>
+          </a:p>
+        </p:txBody>
+      </p:sp>
+      <p:sp>
+        <p:nvSpPr>
+          <p:cNvPr id="24" name="TextBox 23"/>
+          <p:cNvSpPr txBox="1"/>
+          <p:nvPr/>
+        </p:nvSpPr>
+        <p:spPr>
+          <a:xfrm>
+            <a:off x="1654594" y="2261730"/>
+            <a:ext cx="307408" cy="369332"/>
+          </a:xfrm>
+          <a:prstGeom prst="rect">
+            <a:avLst/>
+          </a:prstGeom>
+          <a:noFill/>
+        </p:spPr>
+        <p:txBody>
+          <a:bodyPr wrap="none" rtlCol="0">
+            <a:spAutoFit/>
+          </a:bodyPr>
+          <a:lstStyle/>
+          <a:p>
+            <a:r>
+              <a:rPr lang="el-GR" dirty="0"/>
+              <a:t>θ</a:t>
+            </a:r>
+            <a:endParaRPr lang="en-US" dirty="0"/>
+          </a:p>
+        </p:txBody>
+      </p:sp>
+      <p:sp>
+        <p:nvSpPr>
+          <p:cNvPr id="26" name="TextBox 25"/>
+          <p:cNvSpPr txBox="1"/>
+          <p:nvPr/>
+        </p:nvSpPr>
+        <p:spPr>
+          <a:xfrm>
+            <a:off x="3972417" y="2987597"/>
+            <a:ext cx="275849" cy="369332"/>
+          </a:xfrm>
+          <a:prstGeom prst="rect">
+            <a:avLst/>
+          </a:prstGeom>
+          <a:noFill/>
+        </p:spPr>
+        <p:txBody>
+          <a:bodyPr wrap="none" rtlCol="0">
+            <a:spAutoFit/>
+          </a:bodyPr>
+          <a:lstStyle/>
+          <a:p>
+            <a:r>
+              <a:rPr lang="en-US" dirty="0" smtClean="0"/>
+              <a:t>z</a:t>
+            </a:r>
+            <a:endParaRPr lang="en-US" dirty="0"/>
+          </a:p>
+        </p:txBody>
+      </p:sp>
+      <p:sp>
+        <p:nvSpPr>
+          <p:cNvPr id="27" name="TextBox 26"/>
+          <p:cNvSpPr txBox="1"/>
+          <p:nvPr/>
+        </p:nvSpPr>
+        <p:spPr>
+          <a:xfrm>
+            <a:off x="3433050" y="4098677"/>
+            <a:ext cx="349675" cy="369332"/>
+          </a:xfrm>
+          <a:prstGeom prst="rect">
+            <a:avLst/>
+          </a:prstGeom>
+          <a:noFill/>
+        </p:spPr>
+        <p:txBody>
+          <a:bodyPr wrap="none" rtlCol="0">
+            <a:spAutoFit/>
+          </a:bodyPr>
+          <a:lstStyle/>
+          <a:p>
+            <a:r>
+              <a:rPr lang="en-US" dirty="0" smtClean="0"/>
+              <a:t>w</a:t>
+            </a:r>
+            <a:endParaRPr lang="en-US" dirty="0"/>
+          </a:p>
+        </p:txBody>
+      </p:sp>
+      <p:sp>
+        <p:nvSpPr>
+          <p:cNvPr id="32" name="TextBox 31"/>
+          <p:cNvSpPr txBox="1"/>
+          <p:nvPr/>
+        </p:nvSpPr>
+        <p:spPr>
+          <a:xfrm>
+            <a:off x="4687054" y="4405269"/>
+            <a:ext cx="441683" cy="369332"/>
+          </a:xfrm>
+          <a:prstGeom prst="rect">
+            <a:avLst/>
+          </a:prstGeom>
+          <a:noFill/>
+        </p:spPr>
+        <p:txBody>
+          <a:bodyPr wrap="none" rtlCol="0">
+            <a:spAutoFit/>
+          </a:bodyPr>
+          <a:lstStyle/>
+          <a:p>
+            <a:r>
+              <a:rPr lang="en-US" i="1" dirty="0" smtClean="0"/>
+              <a:t>N</a:t>
+            </a:r>
+            <a:r>
+              <a:rPr lang="en-US" i="1" baseline="-25000" dirty="0"/>
+              <a:t>s</a:t>
+            </a:r>
+            <a:endParaRPr lang="en-US" i="1" dirty="0"/>
+          </a:p>
+        </p:txBody>
+      </p:sp>
+      <p:sp>
+        <p:nvSpPr>
+          <p:cNvPr id="33" name="TextBox 32"/>
+          <p:cNvSpPr txBox="1"/>
+          <p:nvPr/>
+        </p:nvSpPr>
+        <p:spPr>
+          <a:xfrm>
+            <a:off x="2265623" y="4369552"/>
+            <a:ext cx="361071" cy="369332"/>
+          </a:xfrm>
+          <a:prstGeom prst="rect">
+            <a:avLst/>
+          </a:prstGeom>
+          <a:noFill/>
+        </p:spPr>
+        <p:txBody>
+          <a:bodyPr wrap="none" rtlCol="0">
+            <a:spAutoFit/>
+          </a:bodyPr>
+          <a:lstStyle/>
+          <a:p>
+            <a:r>
+              <a:rPr lang="en-US" i="1" dirty="0"/>
+              <a:t>K</a:t>
+            </a:r>
+          </a:p>
+        </p:txBody>
+      </p:sp>
+      <p:sp>
+        <p:nvSpPr>
+          <p:cNvPr id="34" name="TextBox 33"/>
+          <p:cNvSpPr txBox="1"/>
+          <p:nvPr/>
+        </p:nvSpPr>
+        <p:spPr>
+          <a:xfrm>
+            <a:off x="1878523" y="2621116"/>
+            <a:ext cx="976065" cy="369332"/>
+          </a:xfrm>
+          <a:prstGeom prst="rect">
+            <a:avLst/>
+          </a:prstGeom>
+          <a:noFill/>
+        </p:spPr>
+        <p:txBody>
+          <a:bodyPr wrap="square" rtlCol="0">
+            <a:spAutoFit/>
+          </a:bodyPr>
+          <a:lstStyle/>
+          <a:p>
+            <a:r>
+              <a:rPr lang="en-US" i="1" dirty="0"/>
+              <a:t>V</a:t>
+            </a:r>
+            <a:r>
+              <a:rPr lang="el-GR" i="1" dirty="0"/>
+              <a:t>(</a:t>
+            </a:r>
+            <a:r>
+              <a:rPr lang="el-GR" i="1" dirty="0" smtClean="0"/>
+              <a:t>Α)</a:t>
+            </a:r>
+            <a:endParaRPr lang="en-US" i="1" dirty="0"/>
+          </a:p>
+        </p:txBody>
+      </p:sp>
+      <p:cxnSp>
+        <p:nvCxnSpPr>
+          <p:cNvPr id="36" name="Straight Arrow Connector 35"/>
+          <p:cNvCxnSpPr>
+            <a:stCxn id="19" idx="4"/>
+            <a:endCxn id="13" idx="0"/>
+          </p:cNvCxnSpPr>
+          <p:nvPr/>
+        </p:nvCxnSpPr>
+        <p:spPr>
+          <a:xfrm>
+            <a:off x="1797101" y="1646963"/>
+            <a:ext cx="8833" cy="509615"/>
+          </a:xfrm>
+          <a:prstGeom prst="straightConnector1">
+            <a:avLst/>
+          </a:prstGeom>
+          <a:ln>
+            <a:solidFill>
+              <a:srgbClr val="000000"/>
+            </a:solidFill>
+            <a:tailEnd type="arrow"/>
+          </a:ln>
+        </p:spPr>
+        <p:style>
+          <a:lnRef idx="2">
+            <a:schemeClr val="accent1"/>
+          </a:lnRef>
+          <a:fillRef idx="0">
+            <a:schemeClr val="accent1"/>
+          </a:fillRef>
+          <a:effectRef idx="1">
+            <a:schemeClr val="accent1"/>
+          </a:effectRef>
+          <a:fontRef idx="minor">
+            <a:schemeClr val="tx1"/>
+          </a:fontRef>
+        </p:style>
+      </p:cxnSp>
+      <p:cxnSp>
+        <p:nvCxnSpPr>
+          <p:cNvPr id="37" name="Straight Arrow Connector 36"/>
+          <p:cNvCxnSpPr>
+            <a:stCxn id="13" idx="6"/>
+            <a:endCxn id="14" idx="2"/>
+          </p:cNvCxnSpPr>
+          <p:nvPr/>
+        </p:nvCxnSpPr>
+        <p:spPr>
+          <a:xfrm>
+            <a:off x="2098542" y="2449050"/>
+            <a:ext cx="1773276" cy="767605"/>
+          </a:xfrm>
+          <a:prstGeom prst="straightConnector1">
+            <a:avLst/>
+          </a:prstGeom>
+          <a:ln>
+            <a:solidFill>
+              <a:srgbClr val="000000"/>
+            </a:solidFill>
+            <a:tailEnd type="arrow"/>
+          </a:ln>
+        </p:spPr>
+        <p:style>
+          <a:lnRef idx="2">
+            <a:schemeClr val="accent1"/>
+          </a:lnRef>
+          <a:fillRef idx="0">
+            <a:schemeClr val="accent1"/>
+          </a:fillRef>
+          <a:effectRef idx="1">
+            <a:schemeClr val="accent1"/>
+          </a:effectRef>
+          <a:fontRef idx="minor">
+            <a:schemeClr val="tx1"/>
+          </a:fontRef>
+        </p:style>
+      </p:cxnSp>
+      <p:cxnSp>
+        <p:nvCxnSpPr>
+          <p:cNvPr id="39" name="Straight Arrow Connector 38"/>
+          <p:cNvCxnSpPr>
+            <a:stCxn id="18" idx="0"/>
+            <a:endCxn id="9" idx="4"/>
+          </p:cNvCxnSpPr>
+          <p:nvPr/>
+        </p:nvCxnSpPr>
+        <p:spPr>
+          <a:xfrm flipH="1" flipV="1">
+            <a:off x="2025321" y="4621068"/>
+            <a:ext cx="1508" cy="415367"/>
+          </a:xfrm>
+          <a:prstGeom prst="straightConnector1">
+            <a:avLst/>
+          </a:prstGeom>
+          <a:ln>
+            <a:solidFill>
+              <a:srgbClr val="000000"/>
+            </a:solidFill>
+            <a:tailEnd type="arrow"/>
+          </a:ln>
+        </p:spPr>
+        <p:style>
+          <a:lnRef idx="2">
+            <a:schemeClr val="accent1"/>
+          </a:lnRef>
+          <a:fillRef idx="0">
+            <a:schemeClr val="accent1"/>
+          </a:fillRef>
+          <a:effectRef idx="1">
+            <a:schemeClr val="accent1"/>
+          </a:effectRef>
+          <a:fontRef idx="minor">
+            <a:schemeClr val="tx1"/>
+          </a:fontRef>
+        </p:style>
+      </p:cxnSp>
+      <p:cxnSp>
+        <p:nvCxnSpPr>
+          <p:cNvPr id="40" name="Straight Arrow Connector 39"/>
+          <p:cNvCxnSpPr>
+            <a:stCxn id="9" idx="6"/>
+            <a:endCxn id="15" idx="2"/>
+          </p:cNvCxnSpPr>
+          <p:nvPr/>
+        </p:nvCxnSpPr>
+        <p:spPr>
+          <a:xfrm flipV="1">
+            <a:off x="2317929" y="4320018"/>
+            <a:ext cx="1060501" cy="8579"/>
+          </a:xfrm>
+          <a:prstGeom prst="straightConnector1">
+            <a:avLst/>
+          </a:prstGeom>
+          <a:ln>
+            <a:solidFill>
+              <a:srgbClr val="000000"/>
+            </a:solidFill>
+            <a:tailEnd type="arrow"/>
+          </a:ln>
+        </p:spPr>
+        <p:style>
+          <a:lnRef idx="2">
+            <a:schemeClr val="accent1"/>
+          </a:lnRef>
+          <a:fillRef idx="0">
+            <a:schemeClr val="accent1"/>
+          </a:fillRef>
+          <a:effectRef idx="1">
+            <a:schemeClr val="accent1"/>
+          </a:effectRef>
+          <a:fontRef idx="minor">
+            <a:schemeClr val="tx1"/>
+          </a:fontRef>
+        </p:style>
+      </p:cxnSp>
+      <p:cxnSp>
+        <p:nvCxnSpPr>
+          <p:cNvPr id="43" name="Straight Arrow Connector 42"/>
+          <p:cNvCxnSpPr>
+            <a:stCxn id="4" idx="4"/>
+            <a:endCxn id="14" idx="0"/>
+          </p:cNvCxnSpPr>
+          <p:nvPr/>
+        </p:nvCxnSpPr>
+        <p:spPr>
+          <a:xfrm>
+            <a:off x="4100418" y="2611003"/>
+            <a:ext cx="0" cy="377052"/>
+          </a:xfrm>
+          <a:prstGeom prst="straightConnector1">
+            <a:avLst/>
+          </a:prstGeom>
+          <a:ln>
+            <a:solidFill>
+              <a:srgbClr val="000000"/>
+            </a:solidFill>
+            <a:tailEnd type="arrow"/>
+          </a:ln>
+        </p:spPr>
+        <p:style>
+          <a:lnRef idx="2">
+            <a:schemeClr val="accent1"/>
+          </a:lnRef>
+          <a:fillRef idx="0">
+            <a:schemeClr val="accent1"/>
+          </a:fillRef>
+          <a:effectRef idx="1">
+            <a:schemeClr val="accent1"/>
+          </a:effectRef>
+          <a:fontRef idx="minor">
+            <a:schemeClr val="tx1"/>
+          </a:fontRef>
+        </p:style>
+      </p:cxnSp>
+      <p:cxnSp>
+        <p:nvCxnSpPr>
+          <p:cNvPr id="44" name="Straight Arrow Connector 43"/>
+          <p:cNvCxnSpPr>
+            <a:stCxn id="14" idx="4"/>
+            <a:endCxn id="15" idx="0"/>
+          </p:cNvCxnSpPr>
+          <p:nvPr/>
+        </p:nvCxnSpPr>
+        <p:spPr>
+          <a:xfrm flipH="1">
+            <a:off x="3607030" y="3445255"/>
+            <a:ext cx="493388" cy="646163"/>
+          </a:xfrm>
+          <a:prstGeom prst="straightConnector1">
+            <a:avLst/>
+          </a:prstGeom>
+          <a:ln>
+            <a:solidFill>
+              <a:srgbClr val="000000"/>
+            </a:solidFill>
+            <a:tailEnd type="arrow"/>
+          </a:ln>
+        </p:spPr>
+        <p:style>
+          <a:lnRef idx="2">
+            <a:schemeClr val="accent1"/>
+          </a:lnRef>
+          <a:fillRef idx="0">
+            <a:schemeClr val="accent1"/>
+          </a:fillRef>
+          <a:effectRef idx="1">
+            <a:schemeClr val="accent1"/>
+          </a:effectRef>
+          <a:fontRef idx="minor">
+            <a:schemeClr val="tx1"/>
+          </a:fontRef>
+        </p:style>
+      </p:cxnSp>
+      <p:sp>
+        <p:nvSpPr>
+          <p:cNvPr id="45" name="Oval 44"/>
+          <p:cNvSpPr/>
+          <p:nvPr/>
+        </p:nvSpPr>
+        <p:spPr>
+          <a:xfrm>
+            <a:off x="4318263" y="4101989"/>
+            <a:ext cx="457200" cy="457200"/>
+          </a:xfrm>
+          <a:prstGeom prst="ellipse">
+            <a:avLst/>
+          </a:prstGeom>
+          <a:solidFill>
+            <a:srgbClr val="7F7F7F"/>
+          </a:solidFill>
+          <a:ln>
+            <a:solidFill>
+              <a:srgbClr val="000000"/>
+            </a:solidFill>
+          </a:ln>
+        </p:spPr>
+        <p:style>
+          <a:lnRef idx="1">
+            <a:schemeClr val="accent1"/>
+          </a:lnRef>
+          <a:fillRef idx="3">
+            <a:schemeClr val="accent1"/>
+          </a:fillRef>
+          <a:effectRef idx="2">
+            <a:schemeClr val="accent1"/>
+          </a:effectRef>
+          <a:fontRef idx="minor">
+            <a:schemeClr val="lt1"/>
+          </a:fontRef>
+        </p:style>
+        <p:txBody>
+          <a:bodyPr rtlCol="0" anchor="ctr"/>
+          <a:lstStyle/>
+          <a:p>
+            <a:pPr algn="ctr"/>
+            <a:endParaRPr lang="en-US"/>
+          </a:p>
+        </p:txBody>
+      </p:sp>
+      <p:sp>
+        <p:nvSpPr>
+          <p:cNvPr id="46" name="TextBox 45"/>
+          <p:cNvSpPr txBox="1"/>
+          <p:nvPr/>
+        </p:nvSpPr>
+        <p:spPr>
+          <a:xfrm>
+            <a:off x="4372883" y="4109248"/>
+            <a:ext cx="314171" cy="369332"/>
+          </a:xfrm>
+          <a:prstGeom prst="rect">
+            <a:avLst/>
+          </a:prstGeom>
+          <a:noFill/>
+        </p:spPr>
+        <p:txBody>
+          <a:bodyPr wrap="none" rtlCol="0">
+            <a:spAutoFit/>
+          </a:bodyPr>
+          <a:lstStyle/>
+          <a:p>
+            <a:pPr algn="ctr"/>
+            <a:r>
+              <a:rPr lang="en-US" dirty="0" smtClean="0"/>
+              <a:t> t</a:t>
+            </a:r>
+            <a:endParaRPr lang="en-US" dirty="0"/>
+          </a:p>
+        </p:txBody>
+      </p:sp>
+      <p:cxnSp>
+        <p:nvCxnSpPr>
+          <p:cNvPr id="47" name="Straight Arrow Connector 46"/>
+          <p:cNvCxnSpPr>
+            <a:stCxn id="14" idx="4"/>
+            <a:endCxn id="46" idx="0"/>
+          </p:cNvCxnSpPr>
+          <p:nvPr/>
+        </p:nvCxnSpPr>
+        <p:spPr>
+          <a:xfrm>
+            <a:off x="4100418" y="3445255"/>
+            <a:ext cx="429551" cy="663993"/>
+          </a:xfrm>
+          <a:prstGeom prst="straightConnector1">
+            <a:avLst/>
+          </a:prstGeom>
+          <a:ln>
+            <a:solidFill>
+              <a:srgbClr val="000000"/>
+            </a:solidFill>
+            <a:tailEnd type="arrow"/>
+          </a:ln>
+        </p:spPr>
+        <p:style>
+          <a:lnRef idx="2">
+            <a:schemeClr val="accent1"/>
+          </a:lnRef>
+          <a:fillRef idx="0">
+            <a:schemeClr val="accent1"/>
+          </a:fillRef>
+          <a:effectRef idx="1">
+            <a:schemeClr val="accent1"/>
+          </a:effectRef>
+          <a:fontRef idx="minor">
+            <a:schemeClr val="tx1"/>
+          </a:fontRef>
+        </p:style>
+      </p:cxnSp>
+      <p:sp>
+        <p:nvSpPr>
+          <p:cNvPr id="48" name="Rectangle 47"/>
+          <p:cNvSpPr/>
+          <p:nvPr/>
+        </p:nvSpPr>
+        <p:spPr>
+          <a:xfrm>
+            <a:off x="5638405" y="3947712"/>
+            <a:ext cx="969534" cy="803416"/>
+          </a:xfrm>
+          <a:prstGeom prst="rect">
+            <a:avLst/>
+          </a:prstGeom>
+          <a:noFill/>
+          <a:ln>
+            <a:solidFill>
+              <a:schemeClr val="tx1"/>
+            </a:solidFill>
+          </a:ln>
+        </p:spPr>
+        <p:style>
+          <a:lnRef idx="1">
+            <a:schemeClr val="accent1"/>
+          </a:lnRef>
+          <a:fillRef idx="3">
+            <a:schemeClr val="accent1"/>
+          </a:fillRef>
+          <a:effectRef idx="2">
+            <a:schemeClr val="accent1"/>
+          </a:effectRef>
+          <a:fontRef idx="minor">
+            <a:schemeClr val="lt1"/>
+          </a:fontRef>
+        </p:style>
+        <p:txBody>
+          <a:bodyPr rtlCol="0" anchor="ctr"/>
+          <a:lstStyle/>
+          <a:p>
+            <a:pPr algn="ctr"/>
+            <a:endParaRPr lang="en-US"/>
+          </a:p>
+        </p:txBody>
+      </p:sp>
+      <p:sp>
+        <p:nvSpPr>
+          <p:cNvPr id="49" name="Oval 48"/>
+          <p:cNvSpPr/>
+          <p:nvPr/>
+        </p:nvSpPr>
+        <p:spPr>
+          <a:xfrm>
+            <a:off x="5836410" y="4056948"/>
+            <a:ext cx="585216" cy="584943"/>
+          </a:xfrm>
+          <a:prstGeom prst="ellipse">
+            <a:avLst/>
+          </a:prstGeom>
+          <a:noFill/>
+          <a:ln>
+            <a:solidFill>
+              <a:srgbClr val="000000"/>
+            </a:solidFill>
+          </a:ln>
+        </p:spPr>
+        <p:style>
+          <a:lnRef idx="1">
+            <a:schemeClr val="accent1"/>
+          </a:lnRef>
+          <a:fillRef idx="3">
+            <a:schemeClr val="accent1"/>
+          </a:fillRef>
+          <a:effectRef idx="2">
+            <a:schemeClr val="accent1"/>
+          </a:effectRef>
+          <a:fontRef idx="minor">
+            <a:schemeClr val="lt1"/>
+          </a:fontRef>
+        </p:style>
+        <p:txBody>
+          <a:bodyPr rtlCol="0" anchor="ctr"/>
+          <a:lstStyle/>
+          <a:p>
+            <a:pPr algn="ctr"/>
+            <a:endParaRPr lang="en-US"/>
+          </a:p>
+        </p:txBody>
+      </p:sp>
+      <p:sp>
+        <p:nvSpPr>
+          <p:cNvPr id="50" name="Oval 49"/>
+          <p:cNvSpPr/>
+          <p:nvPr/>
+        </p:nvSpPr>
+        <p:spPr>
+          <a:xfrm>
+            <a:off x="5913165" y="3240094"/>
+            <a:ext cx="457200" cy="457200"/>
+          </a:xfrm>
+          <a:prstGeom prst="ellipse">
+            <a:avLst/>
+          </a:prstGeom>
+          <a:noFill/>
+          <a:ln>
+            <a:solidFill>
+              <a:srgbClr val="000000"/>
+            </a:solidFill>
+          </a:ln>
+        </p:spPr>
+        <p:style>
+          <a:lnRef idx="1">
+            <a:schemeClr val="accent1"/>
+          </a:lnRef>
+          <a:fillRef idx="3">
+            <a:schemeClr val="accent1"/>
+          </a:fillRef>
+          <a:effectRef idx="2">
+            <a:schemeClr val="accent1"/>
+          </a:effectRef>
+          <a:fontRef idx="minor">
+            <a:schemeClr val="lt1"/>
+          </a:fontRef>
+        </p:style>
+        <p:txBody>
+          <a:bodyPr rtlCol="0" anchor="ctr"/>
+          <a:lstStyle/>
+          <a:p>
+            <a:pPr algn="ctr"/>
+            <a:endParaRPr lang="en-US"/>
+          </a:p>
+        </p:txBody>
+      </p:sp>
+      <p:sp>
+        <p:nvSpPr>
+          <p:cNvPr id="51" name="TextBox 50"/>
+          <p:cNvSpPr txBox="1"/>
+          <p:nvPr/>
+        </p:nvSpPr>
+        <p:spPr>
+          <a:xfrm>
+            <a:off x="5993749" y="3242948"/>
+            <a:ext cx="287684" cy="369332"/>
+          </a:xfrm>
+          <a:prstGeom prst="rect">
+            <a:avLst/>
+          </a:prstGeom>
+          <a:noFill/>
+        </p:spPr>
+        <p:txBody>
+          <a:bodyPr wrap="none" rtlCol="0">
+            <a:spAutoFit/>
+          </a:bodyPr>
+          <a:lstStyle/>
+          <a:p>
+            <a:pPr algn="ctr"/>
+            <a:r>
+              <a:rPr lang="el-GR" dirty="0" smtClean="0"/>
+              <a:t>γ</a:t>
+            </a:r>
+            <a:endParaRPr lang="en-US" dirty="0"/>
+          </a:p>
+        </p:txBody>
+      </p:sp>
+      <p:sp>
+        <p:nvSpPr>
+          <p:cNvPr id="52" name="TextBox 51"/>
+          <p:cNvSpPr txBox="1"/>
+          <p:nvPr/>
+        </p:nvSpPr>
+        <p:spPr>
+          <a:xfrm>
+            <a:off x="5980094" y="4130071"/>
+            <a:ext cx="274434" cy="369332"/>
+          </a:xfrm>
+          <a:prstGeom prst="rect">
+            <a:avLst/>
+          </a:prstGeom>
+          <a:noFill/>
+        </p:spPr>
+        <p:txBody>
+          <a:bodyPr wrap="none" rtlCol="0">
+            <a:spAutoFit/>
+          </a:bodyPr>
+          <a:lstStyle/>
+          <a:p>
+            <a:r>
+              <a:rPr lang="el-GR" dirty="0"/>
+              <a:t>ξ</a:t>
+            </a:r>
+            <a:endParaRPr lang="en-US" dirty="0"/>
+          </a:p>
+        </p:txBody>
+      </p:sp>
+      <p:sp>
+        <p:nvSpPr>
+          <p:cNvPr id="53" name="TextBox 52"/>
+          <p:cNvSpPr txBox="1"/>
+          <p:nvPr/>
+        </p:nvSpPr>
+        <p:spPr>
+          <a:xfrm>
+            <a:off x="6369320" y="4390375"/>
+            <a:ext cx="361071" cy="369332"/>
+          </a:xfrm>
+          <a:prstGeom prst="rect">
+            <a:avLst/>
+          </a:prstGeom>
+          <a:noFill/>
+        </p:spPr>
+        <p:txBody>
+          <a:bodyPr wrap="none" rtlCol="0">
+            <a:spAutoFit/>
+          </a:bodyPr>
+          <a:lstStyle/>
+          <a:p>
+            <a:r>
+              <a:rPr lang="en-US" i="1" dirty="0"/>
+              <a:t>K</a:t>
+            </a:r>
+          </a:p>
+        </p:txBody>
+      </p:sp>
+      <p:cxnSp>
+        <p:nvCxnSpPr>
+          <p:cNvPr id="54" name="Straight Arrow Connector 53"/>
+          <p:cNvCxnSpPr>
+            <a:stCxn id="50" idx="4"/>
+            <a:endCxn id="49" idx="0"/>
+          </p:cNvCxnSpPr>
+          <p:nvPr/>
+        </p:nvCxnSpPr>
+        <p:spPr>
+          <a:xfrm flipH="1">
+            <a:off x="6129018" y="3697294"/>
+            <a:ext cx="12747" cy="359654"/>
+          </a:xfrm>
+          <a:prstGeom prst="straightConnector1">
+            <a:avLst/>
+          </a:prstGeom>
+          <a:ln>
+            <a:solidFill>
+              <a:srgbClr val="000000"/>
+            </a:solidFill>
+            <a:tailEnd type="arrow"/>
+          </a:ln>
+        </p:spPr>
+        <p:style>
+          <a:lnRef idx="2">
+            <a:schemeClr val="accent1"/>
+          </a:lnRef>
+          <a:fillRef idx="0">
+            <a:schemeClr val="accent1"/>
+          </a:fillRef>
+          <a:effectRef idx="1">
+            <a:schemeClr val="accent1"/>
+          </a:effectRef>
+          <a:fontRef idx="minor">
+            <a:schemeClr val="tx1"/>
+          </a:fontRef>
+        </p:style>
+      </p:cxnSp>
+      <p:cxnSp>
+        <p:nvCxnSpPr>
+          <p:cNvPr id="55" name="Straight Arrow Connector 54"/>
+          <p:cNvCxnSpPr>
+            <a:stCxn id="49" idx="2"/>
+            <a:endCxn id="45" idx="6"/>
+          </p:cNvCxnSpPr>
+          <p:nvPr/>
+        </p:nvCxnSpPr>
+        <p:spPr>
+          <a:xfrm flipH="1" flipV="1">
+            <a:off x="4775463" y="4330589"/>
+            <a:ext cx="1060947" cy="18831"/>
+          </a:xfrm>
+          <a:prstGeom prst="straightConnector1">
+            <a:avLst/>
+          </a:prstGeom>
+          <a:ln>
+            <a:solidFill>
+              <a:srgbClr val="000000"/>
+            </a:solidFill>
+            <a:tailEnd type="arrow"/>
+          </a:ln>
+        </p:spPr>
+        <p:style>
+          <a:lnRef idx="2">
+            <a:schemeClr val="accent1"/>
+          </a:lnRef>
+          <a:fillRef idx="0">
+            <a:schemeClr val="accent1"/>
+          </a:fillRef>
+          <a:effectRef idx="1">
+            <a:schemeClr val="accent1"/>
+          </a:effectRef>
+          <a:fontRef idx="minor">
+            <a:schemeClr val="tx1"/>
+          </a:fontRef>
+        </p:style>
+      </p:cxnSp>
+      <p:sp>
+        <p:nvSpPr>
+          <p:cNvPr id="41" name="TextBox 40"/>
+          <p:cNvSpPr txBox="1"/>
+          <p:nvPr/>
+        </p:nvSpPr>
+        <p:spPr>
+          <a:xfrm>
+            <a:off x="2145234" y="2935705"/>
+            <a:ext cx="468771" cy="369332"/>
+          </a:xfrm>
+          <a:prstGeom prst="rect">
+            <a:avLst/>
+          </a:prstGeom>
+          <a:noFill/>
+        </p:spPr>
+        <p:txBody>
+          <a:bodyPr wrap="none" rtlCol="0">
+            <a:spAutoFit/>
+          </a:bodyPr>
+          <a:lstStyle/>
+          <a:p>
+            <a:r>
+              <a:rPr lang="el-GR" i="1" dirty="0" smtClean="0"/>
+              <a:t>Α</a:t>
+            </a:r>
+            <a:r>
+              <a:rPr lang="el-GR" i="1" baseline="-25000" dirty="0" smtClean="0"/>
+              <a:t>Ω</a:t>
+            </a:r>
+            <a:endParaRPr lang="en-US" i="1" dirty="0"/>
+          </a:p>
+        </p:txBody>
+      </p:sp>
+      <p:sp>
+        <p:nvSpPr>
+          <p:cNvPr id="56" name="Rectangle 55"/>
+          <p:cNvSpPr/>
+          <p:nvPr/>
+        </p:nvSpPr>
+        <p:spPr>
+          <a:xfrm>
+            <a:off x="1202529" y="1835408"/>
+            <a:ext cx="1362791" cy="1521521"/>
+          </a:xfrm>
+          <a:prstGeom prst="rect">
+            <a:avLst/>
+          </a:prstGeom>
+          <a:noFill/>
+          <a:ln>
+            <a:solidFill>
+              <a:schemeClr val="tx1"/>
+            </a:solidFill>
+          </a:ln>
+        </p:spPr>
+        <p:style>
+          <a:lnRef idx="1">
+            <a:schemeClr val="accent1"/>
+          </a:lnRef>
+          <a:fillRef idx="3">
+            <a:schemeClr val="accent1"/>
+          </a:fillRef>
+          <a:effectRef idx="2">
+            <a:schemeClr val="accent1"/>
+          </a:effectRef>
+          <a:fontRef idx="minor">
+            <a:schemeClr val="lt1"/>
+          </a:fontRef>
+        </p:style>
+        <p:txBody>
+          <a:bodyPr rtlCol="0" anchor="ctr"/>
+          <a:lstStyle/>
+          <a:p>
+            <a:pPr algn="ctr"/>
+            <a:endParaRPr lang="en-US"/>
+          </a:p>
+        </p:txBody>
+      </p:sp>
+      <p:sp>
+        <p:nvSpPr>
+          <p:cNvPr id="57" name="TextBox 56"/>
+          <p:cNvSpPr txBox="1"/>
+          <p:nvPr/>
+        </p:nvSpPr>
+        <p:spPr>
+          <a:xfrm>
+            <a:off x="4388963" y="2353163"/>
+            <a:ext cx="468771" cy="369332"/>
+          </a:xfrm>
+          <a:prstGeom prst="rect">
+            <a:avLst/>
+          </a:prstGeom>
+          <a:noFill/>
+        </p:spPr>
+        <p:txBody>
+          <a:bodyPr wrap="none" rtlCol="0">
+            <a:spAutoFit/>
+          </a:bodyPr>
+          <a:lstStyle/>
+          <a:p>
+            <a:r>
+              <a:rPr lang="el-GR" i="1" dirty="0" smtClean="0"/>
+              <a:t>Α</a:t>
+            </a:r>
+            <a:r>
+              <a:rPr lang="el-GR" i="1" baseline="-25000" dirty="0" smtClean="0"/>
+              <a:t>Ω</a:t>
+            </a:r>
+            <a:endParaRPr lang="en-US" i="1" dirty="0"/>
+          </a:p>
+        </p:txBody>
+      </p:sp>
+      <p:sp>
+        <p:nvSpPr>
+          <p:cNvPr id="58" name="Rectangle 57"/>
+          <p:cNvSpPr/>
+          <p:nvPr/>
+        </p:nvSpPr>
+        <p:spPr>
+          <a:xfrm>
+            <a:off x="3446258" y="2013627"/>
+            <a:ext cx="1362791" cy="760760"/>
+          </a:xfrm>
+          <a:prstGeom prst="rect">
+            <a:avLst/>
+          </a:prstGeom>
+          <a:noFill/>
+          <a:ln>
+            <a:solidFill>
+              <a:schemeClr val="tx1"/>
+            </a:solidFill>
+          </a:ln>
+        </p:spPr>
+        <p:style>
+          <a:lnRef idx="1">
+            <a:schemeClr val="accent1"/>
+          </a:lnRef>
+          <a:fillRef idx="3">
+            <a:schemeClr val="accent1"/>
+          </a:fillRef>
+          <a:effectRef idx="2">
+            <a:schemeClr val="accent1"/>
+          </a:effectRef>
+          <a:fontRef idx="minor">
+            <a:schemeClr val="lt1"/>
+          </a:fontRef>
+        </p:style>
+        <p:txBody>
+          <a:bodyPr rtlCol="0" anchor="ctr"/>
+          <a:lstStyle/>
+          <a:p>
+            <a:pPr algn="ctr"/>
+            <a:endParaRPr lang="en-US"/>
+          </a:p>
+        </p:txBody>
+      </p:sp>
+      <p:pic>
+        <p:nvPicPr>
+          <p:cNvPr id="2" name="Picture 1"/>
+          <p:cNvPicPr>
+            <a:picLocks noChangeAspect="1"/>
+          </p:cNvPicPr>
+          <p:nvPr/>
+        </p:nvPicPr>
+        <p:blipFill>
+          <a:blip r:embed="rId2"/>
+          <a:stretch>
+            <a:fillRect/>
+          </a:stretch>
+        </p:blipFill>
+        <p:spPr>
+          <a:xfrm>
+            <a:off x="5150803" y="4897409"/>
+            <a:ext cx="199849" cy="278051"/>
+          </a:xfrm>
+          <a:prstGeom prst="rect">
+            <a:avLst/>
+          </a:prstGeom>
+        </p:spPr>
+      </p:pic>
+    </p:spTree>
+    <p:extLst>
+      <p:ext uri="{BB962C8B-B14F-4D97-AF65-F5344CB8AC3E}">
+        <p14:creationId xmlns:p14="http://schemas.microsoft.com/office/powerpoint/2010/main" val="630821951"/>
       </p:ext>
     </p:extLst>
   </p:cSld>

</xml_diff>